<commit_message>
Se continuan procesando los jsons
</commit_message>
<xml_diff>
--- a/examenSegundoParcial/Documentacion.pptx
+++ b/examenSegundoParcial/Documentacion.pptx
@@ -8,6 +8,8 @@
     <p:sldId id="256" r:id="rId2"/>
     <p:sldId id="257" r:id="rId3"/>
     <p:sldId id="258" r:id="rId4"/>
+    <p:sldId id="259" r:id="rId5"/>
+    <p:sldId id="260" r:id="rId6"/>
   </p:sldIdLst>
   <p:sldSz cx="12192000" cy="6858000"/>
   <p:notesSz cx="6858000" cy="9144000"/>
@@ -106,6 +108,11 @@
       </a:defRPr>
     </a:lvl9pPr>
   </p:defaultTextStyle>
+  <p:extLst>
+    <p:ext uri="{EFAFB233-063F-42B5-8137-9DF3F51BA10A}">
+      <p15:sldGuideLst xmlns:p15="http://schemas.microsoft.com/office/powerpoint/2012/main"/>
+    </p:ext>
+  </p:extLst>
 </p:presentation>
 </file>
 
@@ -258,7 +265,7 @@
           <a:p>
             <a:fld id="{54E20A96-9222-E140-8465-10FCF3AA2D53}" type="datetimeFigureOut">
               <a:rPr lang="es-ES_tradnl" smtClean="0"/>
-              <a:t>28/3/19</a:t>
+              <a:t>29/3/19</a:t>
             </a:fld>
             <a:endParaRPr lang="es-ES_tradnl"/>
           </a:p>
@@ -458,7 +465,7 @@
           <a:p>
             <a:fld id="{54E20A96-9222-E140-8465-10FCF3AA2D53}" type="datetimeFigureOut">
               <a:rPr lang="es-ES_tradnl" smtClean="0"/>
-              <a:t>28/3/19</a:t>
+              <a:t>29/3/19</a:t>
             </a:fld>
             <a:endParaRPr lang="es-ES_tradnl"/>
           </a:p>
@@ -668,7 +675,7 @@
           <a:p>
             <a:fld id="{54E20A96-9222-E140-8465-10FCF3AA2D53}" type="datetimeFigureOut">
               <a:rPr lang="es-ES_tradnl" smtClean="0"/>
-              <a:t>28/3/19</a:t>
+              <a:t>29/3/19</a:t>
             </a:fld>
             <a:endParaRPr lang="es-ES_tradnl"/>
           </a:p>
@@ -868,7 +875,7 @@
           <a:p>
             <a:fld id="{54E20A96-9222-E140-8465-10FCF3AA2D53}" type="datetimeFigureOut">
               <a:rPr lang="es-ES_tradnl" smtClean="0"/>
-              <a:t>28/3/19</a:t>
+              <a:t>29/3/19</a:t>
             </a:fld>
             <a:endParaRPr lang="es-ES_tradnl"/>
           </a:p>
@@ -1144,7 +1151,7 @@
           <a:p>
             <a:fld id="{54E20A96-9222-E140-8465-10FCF3AA2D53}" type="datetimeFigureOut">
               <a:rPr lang="es-ES_tradnl" smtClean="0"/>
-              <a:t>28/3/19</a:t>
+              <a:t>29/3/19</a:t>
             </a:fld>
             <a:endParaRPr lang="es-ES_tradnl"/>
           </a:p>
@@ -1412,7 +1419,7 @@
           <a:p>
             <a:fld id="{54E20A96-9222-E140-8465-10FCF3AA2D53}" type="datetimeFigureOut">
               <a:rPr lang="es-ES_tradnl" smtClean="0"/>
-              <a:t>28/3/19</a:t>
+              <a:t>29/3/19</a:t>
             </a:fld>
             <a:endParaRPr lang="es-ES_tradnl"/>
           </a:p>
@@ -1827,7 +1834,7 @@
           <a:p>
             <a:fld id="{54E20A96-9222-E140-8465-10FCF3AA2D53}" type="datetimeFigureOut">
               <a:rPr lang="es-ES_tradnl" smtClean="0"/>
-              <a:t>28/3/19</a:t>
+              <a:t>29/3/19</a:t>
             </a:fld>
             <a:endParaRPr lang="es-ES_tradnl"/>
           </a:p>
@@ -1969,7 +1976,7 @@
           <a:p>
             <a:fld id="{54E20A96-9222-E140-8465-10FCF3AA2D53}" type="datetimeFigureOut">
               <a:rPr lang="es-ES_tradnl" smtClean="0"/>
-              <a:t>28/3/19</a:t>
+              <a:t>29/3/19</a:t>
             </a:fld>
             <a:endParaRPr lang="es-ES_tradnl"/>
           </a:p>
@@ -2082,7 +2089,7 @@
           <a:p>
             <a:fld id="{54E20A96-9222-E140-8465-10FCF3AA2D53}" type="datetimeFigureOut">
               <a:rPr lang="es-ES_tradnl" smtClean="0"/>
-              <a:t>28/3/19</a:t>
+              <a:t>29/3/19</a:t>
             </a:fld>
             <a:endParaRPr lang="es-ES_tradnl"/>
           </a:p>
@@ -2395,7 +2402,7 @@
           <a:p>
             <a:fld id="{54E20A96-9222-E140-8465-10FCF3AA2D53}" type="datetimeFigureOut">
               <a:rPr lang="es-ES_tradnl" smtClean="0"/>
-              <a:t>28/3/19</a:t>
+              <a:t>29/3/19</a:t>
             </a:fld>
             <a:endParaRPr lang="es-ES_tradnl"/>
           </a:p>
@@ -2684,7 +2691,7 @@
           <a:p>
             <a:fld id="{54E20A96-9222-E140-8465-10FCF3AA2D53}" type="datetimeFigureOut">
               <a:rPr lang="es-ES_tradnl" smtClean="0"/>
-              <a:t>28/3/19</a:t>
+              <a:t>29/3/19</a:t>
             </a:fld>
             <a:endParaRPr lang="es-ES_tradnl"/>
           </a:p>
@@ -2927,7 +2934,7 @@
           <a:p>
             <a:fld id="{54E20A96-9222-E140-8465-10FCF3AA2D53}" type="datetimeFigureOut">
               <a:rPr lang="es-ES_tradnl" smtClean="0"/>
-              <a:t>28/3/19</a:t>
+              <a:t>29/3/19</a:t>
             </a:fld>
             <a:endParaRPr lang="es-ES_tradnl"/>
           </a:p>
@@ -3613,14 +3620,380 @@
           <a:bodyPr/>
           <a:lstStyle/>
           <a:p>
-            <a:endParaRPr lang="es-ES_tradnl"/>
-          </a:p>
-        </p:txBody>
-      </p:sp>
+            <a:pPr marL="0" indent="0">
+              <a:buNone/>
+            </a:pPr>
+            <a:r>
+              <a:rPr lang="es-ES_tradnl" dirty="0"/>
+              <a:t>Continúe buscando en las clases del </a:t>
+            </a:r>
+            <a:r>
+              <a:rPr lang="es-ES_tradnl" dirty="0" err="1"/>
+              <a:t>csv</a:t>
+            </a:r>
+            <a:r>
+              <a:rPr lang="es-ES_tradnl" dirty="0"/>
+              <a:t>, para poder ver todos las que tenían un </a:t>
+            </a:r>
+            <a:r>
+              <a:rPr lang="es-ES_tradnl" dirty="0" err="1"/>
+              <a:t>json</a:t>
+            </a:r>
+            <a:r>
+              <a:rPr lang="es-ES_tradnl" dirty="0"/>
+              <a:t> como dato encontré una manera de que, con esto me di cuenta que </a:t>
+            </a:r>
+          </a:p>
+          <a:p>
+            <a:pPr marL="0" indent="0">
+              <a:buNone/>
+            </a:pPr>
+            <a:endParaRPr lang="es-ES_tradnl" dirty="0"/>
+          </a:p>
+        </p:txBody>
+      </p:sp>
+      <p:pic>
+        <p:nvPicPr>
+          <p:cNvPr id="5" name="Picture 4">
+            <a:extLst>
+              <a:ext uri="{FF2B5EF4-FFF2-40B4-BE49-F238E27FC236}">
+                <a16:creationId xmlns:a16="http://schemas.microsoft.com/office/drawing/2014/main" id="{4AD01D1D-7BEB-7A40-A48A-269C6A4E0DD0}"/>
+              </a:ext>
+            </a:extLst>
+          </p:cNvPr>
+          <p:cNvPicPr>
+            <a:picLocks noChangeAspect="1"/>
+          </p:cNvPicPr>
+          <p:nvPr/>
+        </p:nvPicPr>
+        <p:blipFill rotWithShape="1">
+          <a:blip r:embed="rId2"/>
+          <a:srcRect r="3959" b="15603"/>
+          <a:stretch/>
+        </p:blipFill>
+        <p:spPr>
+          <a:xfrm>
+            <a:off x="541639" y="3326652"/>
+            <a:ext cx="6817658" cy="3166223"/>
+          </a:xfrm>
+          <a:prstGeom prst="rect">
+            <a:avLst/>
+          </a:prstGeom>
+        </p:spPr>
+      </p:pic>
+      <p:pic>
+        <p:nvPicPr>
+          <p:cNvPr id="7" name="Picture 6">
+            <a:extLst>
+              <a:ext uri="{FF2B5EF4-FFF2-40B4-BE49-F238E27FC236}">
+                <a16:creationId xmlns:a16="http://schemas.microsoft.com/office/drawing/2014/main" id="{DE8C9270-FEB0-6441-A614-B957D9EAA019}"/>
+              </a:ext>
+            </a:extLst>
+          </p:cNvPr>
+          <p:cNvPicPr>
+            <a:picLocks noChangeAspect="1"/>
+          </p:cNvPicPr>
+          <p:nvPr/>
+        </p:nvPicPr>
+        <p:blipFill>
+          <a:blip r:embed="rId3"/>
+          <a:stretch>
+            <a:fillRect/>
+          </a:stretch>
+        </p:blipFill>
+        <p:spPr>
+          <a:xfrm>
+            <a:off x="8547023" y="3650864"/>
+            <a:ext cx="2806777" cy="2526099"/>
+          </a:xfrm>
+          <a:prstGeom prst="rect">
+            <a:avLst/>
+          </a:prstGeom>
+        </p:spPr>
+      </p:pic>
     </p:spTree>
     <p:extLst>
       <p:ext uri="{BB962C8B-B14F-4D97-AF65-F5344CB8AC3E}">
         <p14:creationId xmlns:p14="http://schemas.microsoft.com/office/powerpoint/2010/main" val="3853731795"/>
+      </p:ext>
+    </p:extLst>
+  </p:cSld>
+  <p:clrMapOvr>
+    <a:masterClrMapping/>
+  </p:clrMapOvr>
+</p:sld>
+</file>
+
+<file path=ppt/slides/slide4.xml><?xml version="1.0" encoding="utf-8"?>
+<p:sld xmlns:a="http://schemas.openxmlformats.org/drawingml/2006/main" xmlns:r="http://schemas.openxmlformats.org/officeDocument/2006/relationships" xmlns:p="http://schemas.openxmlformats.org/presentationml/2006/main">
+  <p:cSld>
+    <p:spTree>
+      <p:nvGrpSpPr>
+        <p:cNvPr id="1" name=""/>
+        <p:cNvGrpSpPr/>
+        <p:nvPr/>
+      </p:nvGrpSpPr>
+      <p:grpSpPr>
+        <a:xfrm>
+          <a:off x="0" y="0"/>
+          <a:ext cx="0" cy="0"/>
+          <a:chOff x="0" y="0"/>
+          <a:chExt cx="0" cy="0"/>
+        </a:xfrm>
+      </p:grpSpPr>
+      <p:sp>
+        <p:nvSpPr>
+          <p:cNvPr id="2" name="Title 1">
+            <a:extLst>
+              <a:ext uri="{FF2B5EF4-FFF2-40B4-BE49-F238E27FC236}">
+                <a16:creationId xmlns:a16="http://schemas.microsoft.com/office/drawing/2014/main" id="{116473F2-CAE8-2D4A-8EEB-3D43BC272E38}"/>
+              </a:ext>
+            </a:extLst>
+          </p:cNvPr>
+          <p:cNvSpPr>
+            <a:spLocks noGrp="1"/>
+          </p:cNvSpPr>
+          <p:nvPr>
+            <p:ph type="title"/>
+          </p:nvPr>
+        </p:nvSpPr>
+        <p:spPr/>
+        <p:txBody>
+          <a:bodyPr/>
+          <a:lstStyle/>
+          <a:p>
+            <a:r>
+              <a:rPr lang="es-ES_tradnl" dirty="0"/>
+              <a:t>Tercera parte </a:t>
+            </a:r>
+          </a:p>
+        </p:txBody>
+      </p:sp>
+      <p:sp>
+        <p:nvSpPr>
+          <p:cNvPr id="3" name="Content Placeholder 2">
+            <a:extLst>
+              <a:ext uri="{FF2B5EF4-FFF2-40B4-BE49-F238E27FC236}">
+                <a16:creationId xmlns:a16="http://schemas.microsoft.com/office/drawing/2014/main" id="{6D066C20-3FFB-F84D-8D2A-3E566B43C781}"/>
+              </a:ext>
+            </a:extLst>
+          </p:cNvPr>
+          <p:cNvSpPr>
+            <a:spLocks noGrp="1"/>
+          </p:cNvSpPr>
+          <p:nvPr>
+            <p:ph idx="1"/>
+          </p:nvPr>
+        </p:nvSpPr>
+        <p:spPr>
+          <a:xfrm>
+            <a:off x="838200" y="1825625"/>
+            <a:ext cx="6225988" cy="4351338"/>
+          </a:xfrm>
+        </p:spPr>
+        <p:txBody>
+          <a:bodyPr/>
+          <a:lstStyle/>
+          <a:p>
+            <a:r>
+              <a:rPr lang="es-ES_tradnl" dirty="0"/>
+              <a:t>A la hora de buscar como cargar los </a:t>
+            </a:r>
+            <a:r>
+              <a:rPr lang="es-ES_tradnl" dirty="0" err="1"/>
+              <a:t>json</a:t>
+            </a:r>
+            <a:r>
+              <a:rPr lang="es-ES_tradnl" dirty="0"/>
+              <a:t> me </a:t>
+            </a:r>
+            <a:r>
+              <a:rPr lang="es-ES_tradnl" dirty="0" err="1"/>
+              <a:t>salio</a:t>
+            </a:r>
+            <a:r>
+              <a:rPr lang="es-ES_tradnl" dirty="0"/>
+              <a:t> el error de que existían valores nulos por lo que </a:t>
+            </a:r>
+            <a:r>
+              <a:rPr lang="es-ES_tradnl" dirty="0" err="1"/>
+              <a:t>procedi</a:t>
+            </a:r>
+            <a:r>
+              <a:rPr lang="es-ES_tradnl" dirty="0"/>
+              <a:t> a ver el porcentaje de valores nulos y únicos para proceder a quitar las clases</a:t>
+            </a:r>
+          </a:p>
+          <a:p>
+            <a:r>
+              <a:rPr lang="es-ES_tradnl" dirty="0" err="1"/>
+              <a:t>Procedi</a:t>
+            </a:r>
+            <a:r>
+              <a:rPr lang="es-ES_tradnl" dirty="0"/>
+              <a:t> a quitar todas las que tuvieran 100 datos únicos, porque no ayudan a la búsqueda de patrones en la clase</a:t>
+            </a:r>
+          </a:p>
+        </p:txBody>
+      </p:sp>
+      <p:pic>
+        <p:nvPicPr>
+          <p:cNvPr id="5" name="Picture 4">
+            <a:extLst>
+              <a:ext uri="{FF2B5EF4-FFF2-40B4-BE49-F238E27FC236}">
+                <a16:creationId xmlns:a16="http://schemas.microsoft.com/office/drawing/2014/main" id="{AD3C0A7E-E74C-4C4F-99AF-DDD533CA1750}"/>
+              </a:ext>
+            </a:extLst>
+          </p:cNvPr>
+          <p:cNvPicPr>
+            <a:picLocks noChangeAspect="1"/>
+          </p:cNvPicPr>
+          <p:nvPr/>
+        </p:nvPicPr>
+        <p:blipFill>
+          <a:blip r:embed="rId2"/>
+          <a:stretch>
+            <a:fillRect/>
+          </a:stretch>
+        </p:blipFill>
+        <p:spPr>
+          <a:xfrm>
+            <a:off x="9320586" y="182562"/>
+            <a:ext cx="2497866" cy="6492875"/>
+          </a:xfrm>
+          <a:prstGeom prst="rect">
+            <a:avLst/>
+          </a:prstGeom>
+        </p:spPr>
+      </p:pic>
+    </p:spTree>
+    <p:extLst>
+      <p:ext uri="{BB962C8B-B14F-4D97-AF65-F5344CB8AC3E}">
+        <p14:creationId xmlns:p14="http://schemas.microsoft.com/office/powerpoint/2010/main" val="2878082406"/>
+      </p:ext>
+    </p:extLst>
+  </p:cSld>
+  <p:clrMapOvr>
+    <a:masterClrMapping/>
+  </p:clrMapOvr>
+</p:sld>
+</file>
+
+<file path=ppt/slides/slide5.xml><?xml version="1.0" encoding="utf-8"?>
+<p:sld xmlns:a="http://schemas.openxmlformats.org/drawingml/2006/main" xmlns:r="http://schemas.openxmlformats.org/officeDocument/2006/relationships" xmlns:p="http://schemas.openxmlformats.org/presentationml/2006/main">
+  <p:cSld>
+    <p:spTree>
+      <p:nvGrpSpPr>
+        <p:cNvPr id="1" name=""/>
+        <p:cNvGrpSpPr/>
+        <p:nvPr/>
+      </p:nvGrpSpPr>
+      <p:grpSpPr>
+        <a:xfrm>
+          <a:off x="0" y="0"/>
+          <a:ext cx="0" cy="0"/>
+          <a:chOff x="0" y="0"/>
+          <a:chExt cx="0" cy="0"/>
+        </a:xfrm>
+      </p:grpSpPr>
+      <p:sp>
+        <p:nvSpPr>
+          <p:cNvPr id="2" name="Title 1">
+            <a:extLst>
+              <a:ext uri="{FF2B5EF4-FFF2-40B4-BE49-F238E27FC236}">
+                <a16:creationId xmlns:a16="http://schemas.microsoft.com/office/drawing/2014/main" id="{89F36B98-DDF4-234A-B288-BE1D0876F193}"/>
+              </a:ext>
+            </a:extLst>
+          </p:cNvPr>
+          <p:cNvSpPr>
+            <a:spLocks noGrp="1"/>
+          </p:cNvSpPr>
+          <p:nvPr>
+            <p:ph type="title"/>
+          </p:nvPr>
+        </p:nvSpPr>
+        <p:spPr>
+          <a:xfrm>
+            <a:off x="838200" y="365125"/>
+            <a:ext cx="10515600" cy="1325563"/>
+          </a:xfrm>
+        </p:spPr>
+        <p:txBody>
+          <a:bodyPr/>
+          <a:lstStyle/>
+          <a:p>
+            <a:r>
+              <a:rPr lang="es-ES_tradnl" dirty="0"/>
+              <a:t>Cuarta parte</a:t>
+            </a:r>
+          </a:p>
+        </p:txBody>
+      </p:sp>
+      <p:sp>
+        <p:nvSpPr>
+          <p:cNvPr id="3" name="Content Placeholder 2">
+            <a:extLst>
+              <a:ext uri="{FF2B5EF4-FFF2-40B4-BE49-F238E27FC236}">
+                <a16:creationId xmlns:a16="http://schemas.microsoft.com/office/drawing/2014/main" id="{0E3A34D7-B59B-374C-B016-5896626ACF47}"/>
+              </a:ext>
+            </a:extLst>
+          </p:cNvPr>
+          <p:cNvSpPr>
+            <a:spLocks noGrp="1"/>
+          </p:cNvSpPr>
+          <p:nvPr>
+            <p:ph idx="1"/>
+          </p:nvPr>
+        </p:nvSpPr>
+        <p:spPr/>
+        <p:txBody>
+          <a:bodyPr/>
+          <a:lstStyle/>
+          <a:p>
+            <a:r>
+              <a:rPr lang="es-ES_tradnl" dirty="0"/>
+              <a:t>Primero con trasformamos las columnas que estaban en </a:t>
+            </a:r>
+            <a:r>
+              <a:rPr lang="es-ES_tradnl" dirty="0" err="1"/>
+              <a:t>json</a:t>
+            </a:r>
+            <a:r>
+              <a:rPr lang="es-ES_tradnl" dirty="0"/>
+              <a:t> para que pudieran ser procesadas convirtiendo los datos que tienen </a:t>
+            </a:r>
+            <a:r>
+              <a:rPr lang="es-ES_tradnl" dirty="0" err="1"/>
+              <a:t>NaN</a:t>
+            </a:r>
+            <a:r>
+              <a:rPr lang="es-ES_tradnl" dirty="0"/>
+              <a:t> a datos con un </a:t>
+            </a:r>
+            <a:r>
+              <a:rPr lang="es-ES_tradnl" dirty="0" err="1"/>
+              <a:t>json</a:t>
+            </a:r>
+            <a:r>
+              <a:rPr lang="es-ES_tradnl" dirty="0"/>
+              <a:t> </a:t>
+            </a:r>
+            <a:r>
+              <a:rPr lang="es-ES_tradnl" dirty="0" err="1"/>
+              <a:t>vacio</a:t>
+            </a:r>
+            <a:r>
+              <a:rPr lang="es-ES_tradnl"/>
+              <a:t> {}</a:t>
+            </a:r>
+            <a:endParaRPr lang="es-ES_tradnl" dirty="0"/>
+          </a:p>
+        </p:txBody>
+      </p:sp>
+    </p:spTree>
+    <p:extLst>
+      <p:ext uri="{BB962C8B-B14F-4D97-AF65-F5344CB8AC3E}">
+        <p14:creationId xmlns:p14="http://schemas.microsoft.com/office/powerpoint/2010/main" val="1982078021"/>
       </p:ext>
     </p:extLst>
   </p:cSld>

</xml_diff>